<commit_message>
add pytsk to list partitions
</commit_message>
<xml_diff>
--- a/NIST_Data_Leakage_Case/py_version/10_list_partitions.pptx
+++ b/NIST_Data_Leakage_Case/py_version/10_list_partitions.pptx
@@ -5,7 +5,7 @@
     <p:sldMasterId id="2147483648" r:id="rId1"/>
   </p:sldMasterIdLst>
   <p:notesMasterIdLst>
-    <p:notesMasterId r:id="rId7"/>
+    <p:notesMasterId r:id="rId10"/>
   </p:notesMasterIdLst>
   <p:sldIdLst>
     <p:sldId id="256" r:id="rId2"/>
@@ -13,6 +13,9 @@
     <p:sldId id="260" r:id="rId4"/>
     <p:sldId id="257" r:id="rId5"/>
     <p:sldId id="258" r:id="rId6"/>
+    <p:sldId id="262" r:id="rId7"/>
+    <p:sldId id="261" r:id="rId8"/>
+    <p:sldId id="263" r:id="rId9"/>
   </p:sldIdLst>
   <p:sldSz cx="12192000" cy="6858000"/>
   <p:notesSz cx="6858000" cy="9144000"/>
@@ -122,7 +125,7 @@
 <file path=ppt/revisionInfo.xml><?xml version="1.0" encoding="utf-8"?>
 <p1510:revInfo xmlns:a="http://schemas.openxmlformats.org/drawingml/2006/main" xmlns:r="http://schemas.openxmlformats.org/officeDocument/2006/relationships" xmlns:p1510="http://schemas.microsoft.com/office/powerpoint/2015/10/main">
   <p1510:revLst>
-    <p1510:client id="{3104F256-EB8F-41F8-90DC-BB8FEF2C102B}" v="1" dt="2023-03-20T14:52:05.475"/>
+    <p1510:client id="{3104F256-EB8F-41F8-90DC-BB8FEF2C102B}" v="3" dt="2023-03-20T15:53:58.010"/>
   </p1510:revLst>
 </p1510:revInfo>
 </file>
@@ -940,7 +943,7 @@
   <pc:docChgLst>
     <pc:chgData name="Weifeng Xu" userId="e7aed605-a3dd-4d5a-a692-a87037af107b" providerId="ADAL" clId="{3104F256-EB8F-41F8-90DC-BB8FEF2C102B}"/>
     <pc:docChg chg="undo custSel addSld modSld">
-      <pc:chgData name="Weifeng Xu" userId="e7aed605-a3dd-4d5a-a692-a87037af107b" providerId="ADAL" clId="{3104F256-EB8F-41F8-90DC-BB8FEF2C102B}" dt="2023-03-20T15:05:30.528" v="379" actId="207"/>
+      <pc:chgData name="Weifeng Xu" userId="e7aed605-a3dd-4d5a-a692-a87037af107b" providerId="ADAL" clId="{3104F256-EB8F-41F8-90DC-BB8FEF2C102B}" dt="2023-03-20T16:04:09.944" v="486"/>
       <pc:docMkLst>
         <pc:docMk/>
       </pc:docMkLst>
@@ -1052,8 +1055,8 @@
           </ac:spMkLst>
         </pc:spChg>
       </pc:sldChg>
-      <pc:sldChg chg="addSp delSp modSp new mod modClrScheme chgLayout">
-        <pc:chgData name="Weifeng Xu" userId="e7aed605-a3dd-4d5a-a692-a87037af107b" providerId="ADAL" clId="{3104F256-EB8F-41F8-90DC-BB8FEF2C102B}" dt="2023-03-20T14:59:34.509" v="276" actId="1076"/>
+      <pc:sldChg chg="addSp delSp modSp new mod modClrScheme chgLayout modNotesTx">
+        <pc:chgData name="Weifeng Xu" userId="e7aed605-a3dd-4d5a-a692-a87037af107b" providerId="ADAL" clId="{3104F256-EB8F-41F8-90DC-BB8FEF2C102B}" dt="2023-03-20T16:04:09.944" v="486"/>
         <pc:sldMkLst>
           <pc:docMk/>
           <pc:sldMk cId="4149809310" sldId="260"/>
@@ -1096,6 +1099,115 @@
             <pc:docMk/>
             <pc:sldMk cId="4149809310" sldId="260"/>
             <ac:picMk id="9" creationId="{80FAB55C-8B2E-4A18-763C-9C57569A6C96}"/>
+          </ac:picMkLst>
+        </pc:picChg>
+      </pc:sldChg>
+      <pc:sldChg chg="addSp delSp modSp new mod modNotesTx">
+        <pc:chgData name="Weifeng Xu" userId="e7aed605-a3dd-4d5a-a692-a87037af107b" providerId="ADAL" clId="{3104F256-EB8F-41F8-90DC-BB8FEF2C102B}" dt="2023-03-20T16:02:15.116" v="482" actId="14100"/>
+        <pc:sldMkLst>
+          <pc:docMk/>
+          <pc:sldMk cId="1742394460" sldId="261"/>
+        </pc:sldMkLst>
+        <pc:picChg chg="add del mod">
+          <ac:chgData name="Weifeng Xu" userId="e7aed605-a3dd-4d5a-a692-a87037af107b" providerId="ADAL" clId="{3104F256-EB8F-41F8-90DC-BB8FEF2C102B}" dt="2023-03-20T15:51:56.203" v="411" actId="21"/>
+          <ac:picMkLst>
+            <pc:docMk/>
+            <pc:sldMk cId="1742394460" sldId="261"/>
+            <ac:picMk id="4" creationId="{2C3508A8-5C7D-793B-3505-ADDB6111057C}"/>
+          </ac:picMkLst>
+        </pc:picChg>
+        <pc:picChg chg="add del mod">
+          <ac:chgData name="Weifeng Xu" userId="e7aed605-a3dd-4d5a-a692-a87037af107b" providerId="ADAL" clId="{3104F256-EB8F-41F8-90DC-BB8FEF2C102B}" dt="2023-03-20T15:38:23.618" v="385" actId="478"/>
+          <ac:picMkLst>
+            <pc:docMk/>
+            <pc:sldMk cId="1742394460" sldId="261"/>
+            <ac:picMk id="6" creationId="{3A289FE8-016A-7E93-5480-C203651FCAF0}"/>
+          </ac:picMkLst>
+        </pc:picChg>
+        <pc:picChg chg="add del mod modCrop">
+          <ac:chgData name="Weifeng Xu" userId="e7aed605-a3dd-4d5a-a692-a87037af107b" providerId="ADAL" clId="{3104F256-EB8F-41F8-90DC-BB8FEF2C102B}" dt="2023-03-20T16:01:53.321" v="479" actId="478"/>
+          <ac:picMkLst>
+            <pc:docMk/>
+            <pc:sldMk cId="1742394460" sldId="261"/>
+            <ac:picMk id="8" creationId="{6C49B107-3DDD-0E10-D581-E9894F816615}"/>
+          </ac:picMkLst>
+        </pc:picChg>
+        <pc:picChg chg="add mod">
+          <ac:chgData name="Weifeng Xu" userId="e7aed605-a3dd-4d5a-a692-a87037af107b" providerId="ADAL" clId="{3104F256-EB8F-41F8-90DC-BB8FEF2C102B}" dt="2023-03-20T16:02:15.116" v="482" actId="14100"/>
+          <ac:picMkLst>
+            <pc:docMk/>
+            <pc:sldMk cId="1742394460" sldId="261"/>
+            <ac:picMk id="10" creationId="{143A851C-44FD-05D0-FFA8-578EF8258E13}"/>
+          </ac:picMkLst>
+        </pc:picChg>
+      </pc:sldChg>
+      <pc:sldChg chg="addSp delSp modSp new mod chgLayout">
+        <pc:chgData name="Weifeng Xu" userId="e7aed605-a3dd-4d5a-a692-a87037af107b" providerId="ADAL" clId="{3104F256-EB8F-41F8-90DC-BB8FEF2C102B}" dt="2023-03-20T16:00:38.857" v="476" actId="1076"/>
+        <pc:sldMkLst>
+          <pc:docMk/>
+          <pc:sldMk cId="708627298" sldId="262"/>
+        </pc:sldMkLst>
+        <pc:spChg chg="mod ord">
+          <ac:chgData name="Weifeng Xu" userId="e7aed605-a3dd-4d5a-a692-a87037af107b" providerId="ADAL" clId="{3104F256-EB8F-41F8-90DC-BB8FEF2C102B}" dt="2023-03-20T15:51:50.721" v="410" actId="700"/>
+          <ac:spMkLst>
+            <pc:docMk/>
+            <pc:sldMk cId="708627298" sldId="262"/>
+            <ac:spMk id="2" creationId="{4E2D3884-FE83-0EE6-1B39-B9739118FA3B}"/>
+          </ac:spMkLst>
+        </pc:spChg>
+        <pc:spChg chg="add mod">
+          <ac:chgData name="Weifeng Xu" userId="e7aed605-a3dd-4d5a-a692-a87037af107b" providerId="ADAL" clId="{3104F256-EB8F-41F8-90DC-BB8FEF2C102B}" dt="2023-03-20T15:54:46.172" v="474" actId="207"/>
+          <ac:spMkLst>
+            <pc:docMk/>
+            <pc:sldMk cId="708627298" sldId="262"/>
+            <ac:spMk id="5" creationId="{3F81D14B-4F94-7F51-3A15-DCCC4B5E601A}"/>
+          </ac:spMkLst>
+        </pc:spChg>
+        <pc:spChg chg="add del mod">
+          <ac:chgData name="Weifeng Xu" userId="e7aed605-a3dd-4d5a-a692-a87037af107b" providerId="ADAL" clId="{3104F256-EB8F-41F8-90DC-BB8FEF2C102B}" dt="2023-03-20T15:54:00.873" v="420"/>
+          <ac:spMkLst>
+            <pc:docMk/>
+            <pc:sldMk cId="708627298" sldId="262"/>
+            <ac:spMk id="6" creationId="{B98C0EC3-1C19-A7CB-A049-8A6E752EEFCE}"/>
+          </ac:spMkLst>
+        </pc:spChg>
+        <pc:picChg chg="add mod">
+          <ac:chgData name="Weifeng Xu" userId="e7aed605-a3dd-4d5a-a692-a87037af107b" providerId="ADAL" clId="{3104F256-EB8F-41F8-90DC-BB8FEF2C102B}" dt="2023-03-20T15:52:07.021" v="415" actId="14100"/>
+          <ac:picMkLst>
+            <pc:docMk/>
+            <pc:sldMk cId="708627298" sldId="262"/>
+            <ac:picMk id="3" creationId="{E1AAC393-231C-D24A-3FC7-288E21F62881}"/>
+          </ac:picMkLst>
+        </pc:picChg>
+        <pc:picChg chg="add mod">
+          <ac:chgData name="Weifeng Xu" userId="e7aed605-a3dd-4d5a-a692-a87037af107b" providerId="ADAL" clId="{3104F256-EB8F-41F8-90DC-BB8FEF2C102B}" dt="2023-03-20T16:00:38.857" v="476" actId="1076"/>
+          <ac:picMkLst>
+            <pc:docMk/>
+            <pc:sldMk cId="708627298" sldId="262"/>
+            <ac:picMk id="8" creationId="{D69E58F2-0F0D-64CB-273D-289C1C8DBC32}"/>
+          </ac:picMkLst>
+        </pc:picChg>
+      </pc:sldChg>
+      <pc:sldChg chg="addSp delSp new mod modClrScheme chgLayout">
+        <pc:chgData name="Weifeng Xu" userId="e7aed605-a3dd-4d5a-a692-a87037af107b" providerId="ADAL" clId="{3104F256-EB8F-41F8-90DC-BB8FEF2C102B}" dt="2023-03-20T16:03:58.059" v="485" actId="22"/>
+        <pc:sldMkLst>
+          <pc:docMk/>
+          <pc:sldMk cId="3003831719" sldId="263"/>
+        </pc:sldMkLst>
+        <pc:spChg chg="del">
+          <ac:chgData name="Weifeng Xu" userId="e7aed605-a3dd-4d5a-a692-a87037af107b" providerId="ADAL" clId="{3104F256-EB8F-41F8-90DC-BB8FEF2C102B}" dt="2023-03-20T16:03:05.101" v="484" actId="700"/>
+          <ac:spMkLst>
+            <pc:docMk/>
+            <pc:sldMk cId="3003831719" sldId="263"/>
+            <ac:spMk id="2" creationId="{E1DD0BB0-91C6-5573-77B2-C79C30FBF41F}"/>
+          </ac:spMkLst>
+        </pc:spChg>
+        <pc:picChg chg="add">
+          <ac:chgData name="Weifeng Xu" userId="e7aed605-a3dd-4d5a-a692-a87037af107b" providerId="ADAL" clId="{3104F256-EB8F-41F8-90DC-BB8FEF2C102B}" dt="2023-03-20T16:03:58.059" v="485" actId="22"/>
+          <ac:picMkLst>
+            <pc:docMk/>
+            <pc:sldMk cId="3003831719" sldId="263"/>
+            <ac:picMk id="4" creationId="{1F5FB37B-34D3-FA44-8591-4CF2EEE583F1}"/>
           </ac:picMkLst>
         </pc:picChg>
       </pc:sldChg>
@@ -1638,248 +1750,9 @@
           <a:lstStyle/>
           <a:p>
             <a:r>
-              <a:rPr lang="en-US" dirty="0" err="1">
-                <a:effectLst/>
-              </a:rPr>
-              <a:t>sudo</a:t>
-            </a:r>
-            <a:r>
-              <a:rPr lang="en-US" dirty="0"/>
-              <a:t> </a:t>
-            </a:r>
-            <a:r>
-              <a:rPr lang="en-US" dirty="0">
-                <a:effectLst/>
-              </a:rPr>
-              <a:t>add</a:t>
-            </a:r>
-            <a:r>
-              <a:rPr lang="en-US" dirty="0">
-                <a:solidFill>
-                  <a:srgbClr val="666666"/>
-                </a:solidFill>
-                <a:effectLst/>
-              </a:rPr>
-              <a:t>-</a:t>
-            </a:r>
-            <a:r>
-              <a:rPr lang="en-US" dirty="0">
-                <a:effectLst/>
-              </a:rPr>
-              <a:t>apt</a:t>
-            </a:r>
-            <a:r>
-              <a:rPr lang="en-US" dirty="0">
-                <a:solidFill>
-                  <a:srgbClr val="666666"/>
-                </a:solidFill>
-                <a:effectLst/>
-              </a:rPr>
-              <a:t>-</a:t>
-            </a:r>
-            <a:r>
-              <a:rPr lang="en-US" dirty="0">
-                <a:effectLst/>
-              </a:rPr>
-              <a:t>repository</a:t>
-            </a:r>
-            <a:r>
-              <a:rPr lang="en-US" dirty="0"/>
-              <a:t> </a:t>
-            </a:r>
-            <a:r>
-              <a:rPr lang="en-US" dirty="0">
-                <a:effectLst/>
-              </a:rPr>
-              <a:t>universe</a:t>
-            </a:r>
-          </a:p>
-          <a:p>
-            <a:r>
-              <a:rPr lang="en-GB" dirty="0" err="1">
-                <a:effectLst/>
-              </a:rPr>
-              <a:t>sudo</a:t>
-            </a:r>
-            <a:r>
-              <a:rPr lang="en-GB" dirty="0"/>
-              <a:t> </a:t>
-            </a:r>
-            <a:r>
-              <a:rPr lang="en-GB" dirty="0">
-                <a:effectLst/>
-              </a:rPr>
-              <a:t>add</a:t>
-            </a:r>
-            <a:r>
-              <a:rPr lang="en-GB" dirty="0">
-                <a:solidFill>
-                  <a:srgbClr val="666666"/>
-                </a:solidFill>
-                <a:effectLst/>
-              </a:rPr>
-              <a:t>-</a:t>
-            </a:r>
-            <a:r>
-              <a:rPr lang="en-GB" dirty="0">
-                <a:effectLst/>
-              </a:rPr>
-              <a:t>apt</a:t>
-            </a:r>
-            <a:r>
-              <a:rPr lang="en-GB" dirty="0">
-                <a:solidFill>
-                  <a:srgbClr val="666666"/>
-                </a:solidFill>
-                <a:effectLst/>
-              </a:rPr>
-              <a:t>-</a:t>
-            </a:r>
-            <a:r>
-              <a:rPr lang="en-GB" dirty="0">
-                <a:effectLst/>
-              </a:rPr>
-              <a:t>repository</a:t>
-            </a:r>
-            <a:r>
-              <a:rPr lang="en-GB" dirty="0"/>
-              <a:t> </a:t>
-            </a:r>
-            <a:r>
-              <a:rPr lang="en-GB" dirty="0" err="1">
-                <a:effectLst/>
-              </a:rPr>
-              <a:t>ppa:gift</a:t>
-            </a:r>
-            <a:r>
-              <a:rPr lang="en-GB" dirty="0">
-                <a:solidFill>
-                  <a:srgbClr val="666666"/>
-                </a:solidFill>
-                <a:effectLst/>
-              </a:rPr>
-              <a:t>/</a:t>
-            </a:r>
-            <a:r>
-              <a:rPr lang="en-GB" dirty="0">
-                <a:effectLst/>
-              </a:rPr>
-              <a:t>stable</a:t>
-            </a:r>
-          </a:p>
-          <a:p>
-            <a:r>
-              <a:rPr lang="en-GB" dirty="0" err="1">
-                <a:effectLst/>
-              </a:rPr>
-              <a:t>sudo</a:t>
-            </a:r>
-            <a:r>
-              <a:rPr lang="en-GB" dirty="0"/>
-              <a:t> </a:t>
-            </a:r>
-            <a:r>
-              <a:rPr lang="en-GB" dirty="0">
-                <a:effectLst/>
-              </a:rPr>
-              <a:t>apt</a:t>
-            </a:r>
-            <a:r>
-              <a:rPr lang="en-GB" dirty="0">
-                <a:solidFill>
-                  <a:srgbClr val="666666"/>
-                </a:solidFill>
-                <a:effectLst/>
-              </a:rPr>
-              <a:t>-</a:t>
-            </a:r>
-            <a:r>
-              <a:rPr lang="en-GB" dirty="0">
-                <a:effectLst/>
-              </a:rPr>
-              <a:t>get</a:t>
-            </a:r>
-            <a:r>
-              <a:rPr lang="en-GB" dirty="0"/>
-              <a:t> </a:t>
-            </a:r>
-            <a:r>
-              <a:rPr lang="en-GB" dirty="0">
-                <a:effectLst/>
-              </a:rPr>
-              <a:t>update</a:t>
-            </a:r>
-            <a:r>
-              <a:rPr lang="en-GB" dirty="0"/>
-              <a:t> </a:t>
-            </a:r>
-            <a:r>
-              <a:rPr lang="en-GB" dirty="0" err="1">
-                <a:effectLst/>
-              </a:rPr>
-              <a:t>sudo</a:t>
-            </a:r>
-            <a:r>
-              <a:rPr lang="en-GB" dirty="0"/>
-              <a:t> </a:t>
-            </a:r>
-            <a:r>
-              <a:rPr lang="en-GB" dirty="0">
-                <a:effectLst/>
-              </a:rPr>
-              <a:t>apt</a:t>
-            </a:r>
-            <a:r>
-              <a:rPr lang="en-GB" dirty="0">
-                <a:solidFill>
-                  <a:srgbClr val="666666"/>
-                </a:solidFill>
-                <a:effectLst/>
-              </a:rPr>
-              <a:t>-</a:t>
-            </a:r>
-            <a:r>
-              <a:rPr lang="en-GB" dirty="0">
-                <a:effectLst/>
-              </a:rPr>
-              <a:t>get</a:t>
-            </a:r>
-            <a:r>
-              <a:rPr lang="en-GB" dirty="0"/>
-              <a:t> </a:t>
-            </a:r>
-            <a:r>
-              <a:rPr lang="en-GB" dirty="0">
-                <a:effectLst/>
-              </a:rPr>
-              <a:t>install</a:t>
-            </a:r>
-            <a:r>
-              <a:rPr lang="en-GB" dirty="0"/>
-              <a:t> </a:t>
-            </a:r>
-            <a:r>
-              <a:rPr lang="en-GB" dirty="0" err="1">
-                <a:effectLst/>
-              </a:rPr>
-              <a:t>plaso</a:t>
-            </a:r>
-            <a:r>
-              <a:rPr lang="en-GB" dirty="0">
-                <a:solidFill>
-                  <a:srgbClr val="666666"/>
-                </a:solidFill>
-                <a:effectLst/>
-              </a:rPr>
-              <a:t>-</a:t>
-            </a:r>
-            <a:r>
-              <a:rPr lang="en-GB" dirty="0">
-                <a:effectLst/>
-              </a:rPr>
-              <a:t>tools</a:t>
-            </a:r>
-            <a:endParaRPr lang="en-US" dirty="0"/>
+              <a:rPr lang="en-US"/>
+              <a:t>python3 list_partitions.py cfreds_2015_data_leakage_pc.dd </a:t>
+            </a:r>
           </a:p>
         </p:txBody>
       </p:sp>
@@ -1900,7 +1773,7 @@
           <a:p>
             <a:fld id="{DDBF98C7-164A-4723-84F0-B1E4B080DDEC}" type="slidenum">
               <a:rPr lang="en-US" smtClean="0"/>
-              <a:t>4</a:t>
+              <a:t>3</a:t>
             </a:fld>
             <a:endParaRPr lang="en-US"/>
           </a:p>
@@ -1909,7 +1782,7 @@
     </p:spTree>
     <p:extLst>
       <p:ext uri="{BB962C8B-B14F-4D97-AF65-F5344CB8AC3E}">
-        <p14:creationId xmlns:p14="http://schemas.microsoft.com/office/powerpoint/2010/main" val="2062065646"/>
+        <p14:creationId xmlns:p14="http://schemas.microsoft.com/office/powerpoint/2010/main" val="4255496200"/>
       </p:ext>
     </p:extLst>
   </p:cSld>
@@ -1964,6 +1837,332 @@
           <a:lstStyle/>
           <a:p>
             <a:r>
+              <a:rPr lang="en-US" dirty="0" err="1">
+                <a:effectLst/>
+              </a:rPr>
+              <a:t>sudo</a:t>
+            </a:r>
+            <a:r>
+              <a:rPr lang="en-US" dirty="0"/>
+              <a:t> </a:t>
+            </a:r>
+            <a:r>
+              <a:rPr lang="en-US" dirty="0">
+                <a:effectLst/>
+              </a:rPr>
+              <a:t>add</a:t>
+            </a:r>
+            <a:r>
+              <a:rPr lang="en-US" dirty="0">
+                <a:solidFill>
+                  <a:srgbClr val="666666"/>
+                </a:solidFill>
+                <a:effectLst/>
+              </a:rPr>
+              <a:t>-</a:t>
+            </a:r>
+            <a:r>
+              <a:rPr lang="en-US" dirty="0">
+                <a:effectLst/>
+              </a:rPr>
+              <a:t>apt</a:t>
+            </a:r>
+            <a:r>
+              <a:rPr lang="en-US" dirty="0">
+                <a:solidFill>
+                  <a:srgbClr val="666666"/>
+                </a:solidFill>
+                <a:effectLst/>
+              </a:rPr>
+              <a:t>-</a:t>
+            </a:r>
+            <a:r>
+              <a:rPr lang="en-US" dirty="0">
+                <a:effectLst/>
+              </a:rPr>
+              <a:t>repository</a:t>
+            </a:r>
+            <a:r>
+              <a:rPr lang="en-US" dirty="0"/>
+              <a:t> </a:t>
+            </a:r>
+            <a:r>
+              <a:rPr lang="en-US" dirty="0">
+                <a:effectLst/>
+              </a:rPr>
+              <a:t>universe</a:t>
+            </a:r>
+          </a:p>
+          <a:p>
+            <a:r>
+              <a:rPr lang="en-GB" dirty="0" err="1">
+                <a:effectLst/>
+              </a:rPr>
+              <a:t>sudo</a:t>
+            </a:r>
+            <a:r>
+              <a:rPr lang="en-GB" dirty="0"/>
+              <a:t> </a:t>
+            </a:r>
+            <a:r>
+              <a:rPr lang="en-GB" dirty="0">
+                <a:effectLst/>
+              </a:rPr>
+              <a:t>add</a:t>
+            </a:r>
+            <a:r>
+              <a:rPr lang="en-GB" dirty="0">
+                <a:solidFill>
+                  <a:srgbClr val="666666"/>
+                </a:solidFill>
+                <a:effectLst/>
+              </a:rPr>
+              <a:t>-</a:t>
+            </a:r>
+            <a:r>
+              <a:rPr lang="en-GB" dirty="0">
+                <a:effectLst/>
+              </a:rPr>
+              <a:t>apt</a:t>
+            </a:r>
+            <a:r>
+              <a:rPr lang="en-GB" dirty="0">
+                <a:solidFill>
+                  <a:srgbClr val="666666"/>
+                </a:solidFill>
+                <a:effectLst/>
+              </a:rPr>
+              <a:t>-</a:t>
+            </a:r>
+            <a:r>
+              <a:rPr lang="en-GB" dirty="0">
+                <a:effectLst/>
+              </a:rPr>
+              <a:t>repository</a:t>
+            </a:r>
+            <a:r>
+              <a:rPr lang="en-GB" dirty="0"/>
+              <a:t> </a:t>
+            </a:r>
+            <a:r>
+              <a:rPr lang="en-GB" dirty="0" err="1">
+                <a:effectLst/>
+              </a:rPr>
+              <a:t>ppa:gift</a:t>
+            </a:r>
+            <a:r>
+              <a:rPr lang="en-GB" dirty="0">
+                <a:solidFill>
+                  <a:srgbClr val="666666"/>
+                </a:solidFill>
+                <a:effectLst/>
+              </a:rPr>
+              <a:t>/</a:t>
+            </a:r>
+            <a:r>
+              <a:rPr lang="en-GB" dirty="0">
+                <a:effectLst/>
+              </a:rPr>
+              <a:t>stable</a:t>
+            </a:r>
+          </a:p>
+          <a:p>
+            <a:r>
+              <a:rPr lang="en-GB" dirty="0" err="1">
+                <a:effectLst/>
+              </a:rPr>
+              <a:t>sudo</a:t>
+            </a:r>
+            <a:r>
+              <a:rPr lang="en-GB" dirty="0"/>
+              <a:t> </a:t>
+            </a:r>
+            <a:r>
+              <a:rPr lang="en-GB" dirty="0">
+                <a:effectLst/>
+              </a:rPr>
+              <a:t>apt</a:t>
+            </a:r>
+            <a:r>
+              <a:rPr lang="en-GB" dirty="0">
+                <a:solidFill>
+                  <a:srgbClr val="666666"/>
+                </a:solidFill>
+                <a:effectLst/>
+              </a:rPr>
+              <a:t>-</a:t>
+            </a:r>
+            <a:r>
+              <a:rPr lang="en-GB" dirty="0">
+                <a:effectLst/>
+              </a:rPr>
+              <a:t>get</a:t>
+            </a:r>
+            <a:r>
+              <a:rPr lang="en-GB" dirty="0"/>
+              <a:t> </a:t>
+            </a:r>
+            <a:r>
+              <a:rPr lang="en-GB" dirty="0">
+                <a:effectLst/>
+              </a:rPr>
+              <a:t>update</a:t>
+            </a:r>
+            <a:r>
+              <a:rPr lang="en-GB" dirty="0"/>
+              <a:t> </a:t>
+            </a:r>
+            <a:r>
+              <a:rPr lang="en-GB" dirty="0" err="1">
+                <a:effectLst/>
+              </a:rPr>
+              <a:t>sudo</a:t>
+            </a:r>
+            <a:r>
+              <a:rPr lang="en-GB" dirty="0"/>
+              <a:t> </a:t>
+            </a:r>
+            <a:r>
+              <a:rPr lang="en-GB" dirty="0">
+                <a:effectLst/>
+              </a:rPr>
+              <a:t>apt</a:t>
+            </a:r>
+            <a:r>
+              <a:rPr lang="en-GB" dirty="0">
+                <a:solidFill>
+                  <a:srgbClr val="666666"/>
+                </a:solidFill>
+                <a:effectLst/>
+              </a:rPr>
+              <a:t>-</a:t>
+            </a:r>
+            <a:r>
+              <a:rPr lang="en-GB" dirty="0">
+                <a:effectLst/>
+              </a:rPr>
+              <a:t>get</a:t>
+            </a:r>
+            <a:r>
+              <a:rPr lang="en-GB" dirty="0"/>
+              <a:t> </a:t>
+            </a:r>
+            <a:r>
+              <a:rPr lang="en-GB" dirty="0">
+                <a:effectLst/>
+              </a:rPr>
+              <a:t>install</a:t>
+            </a:r>
+            <a:r>
+              <a:rPr lang="en-GB" dirty="0"/>
+              <a:t> </a:t>
+            </a:r>
+            <a:r>
+              <a:rPr lang="en-GB" dirty="0" err="1">
+                <a:effectLst/>
+              </a:rPr>
+              <a:t>plaso</a:t>
+            </a:r>
+            <a:r>
+              <a:rPr lang="en-GB" dirty="0">
+                <a:solidFill>
+                  <a:srgbClr val="666666"/>
+                </a:solidFill>
+                <a:effectLst/>
+              </a:rPr>
+              <a:t>-</a:t>
+            </a:r>
+            <a:r>
+              <a:rPr lang="en-GB" dirty="0">
+                <a:effectLst/>
+              </a:rPr>
+              <a:t>tools</a:t>
+            </a:r>
+            <a:endParaRPr lang="en-US" dirty="0"/>
+          </a:p>
+        </p:txBody>
+      </p:sp>
+      <p:sp>
+        <p:nvSpPr>
+          <p:cNvPr id="4" name="Slide Number Placeholder 3"/>
+          <p:cNvSpPr>
+            <a:spLocks noGrp="1"/>
+          </p:cNvSpPr>
+          <p:nvPr>
+            <p:ph type="sldNum" sz="quarter" idx="5"/>
+          </p:nvPr>
+        </p:nvSpPr>
+        <p:spPr/>
+        <p:txBody>
+          <a:bodyPr/>
+          <a:lstStyle/>
+          <a:p>
+            <a:fld id="{DDBF98C7-164A-4723-84F0-B1E4B080DDEC}" type="slidenum">
+              <a:rPr lang="en-US" smtClean="0"/>
+              <a:t>4</a:t>
+            </a:fld>
+            <a:endParaRPr lang="en-US"/>
+          </a:p>
+        </p:txBody>
+      </p:sp>
+    </p:spTree>
+    <p:extLst>
+      <p:ext uri="{BB962C8B-B14F-4D97-AF65-F5344CB8AC3E}">
+        <p14:creationId xmlns:p14="http://schemas.microsoft.com/office/powerpoint/2010/main" val="2062065646"/>
+      </p:ext>
+    </p:extLst>
+  </p:cSld>
+  <p:clrMapOvr>
+    <a:masterClrMapping/>
+  </p:clrMapOvr>
+</p:notes>
+</file>
+
+<file path=ppt/notesSlides/notesSlide4.xml><?xml version="1.0" encoding="utf-8"?>
+<p:notes xmlns:a="http://schemas.openxmlformats.org/drawingml/2006/main" xmlns:r="http://schemas.openxmlformats.org/officeDocument/2006/relationships" xmlns:p="http://schemas.openxmlformats.org/presentationml/2006/main">
+  <p:cSld>
+    <p:spTree>
+      <p:nvGrpSpPr>
+        <p:cNvPr id="1" name=""/>
+        <p:cNvGrpSpPr/>
+        <p:nvPr/>
+      </p:nvGrpSpPr>
+      <p:grpSpPr>
+        <a:xfrm>
+          <a:off x="0" y="0"/>
+          <a:ext cx="0" cy="0"/>
+          <a:chOff x="0" y="0"/>
+          <a:chExt cx="0" cy="0"/>
+        </a:xfrm>
+      </p:grpSpPr>
+      <p:sp>
+        <p:nvSpPr>
+          <p:cNvPr id="2" name="Slide Image Placeholder 1"/>
+          <p:cNvSpPr>
+            <a:spLocks noGrp="1" noRot="1" noChangeAspect="1"/>
+          </p:cNvSpPr>
+          <p:nvPr>
+            <p:ph type="sldImg"/>
+          </p:nvPr>
+        </p:nvSpPr>
+        <p:spPr/>
+      </p:sp>
+      <p:sp>
+        <p:nvSpPr>
+          <p:cNvPr id="3" name="Notes Placeholder 2"/>
+          <p:cNvSpPr>
+            <a:spLocks noGrp="1"/>
+          </p:cNvSpPr>
+          <p:nvPr>
+            <p:ph type="body" idx="1"/>
+          </p:nvPr>
+        </p:nvSpPr>
+        <p:spPr/>
+        <p:txBody>
+          <a:bodyPr/>
+          <a:lstStyle/>
+          <a:p>
+            <a:r>
               <a:rPr lang="en-US" dirty="0"/>
               <a:t>log2timeline.py -V</a:t>
             </a:r>
@@ -1997,6 +2196,103 @@
     <p:extLst>
       <p:ext uri="{BB962C8B-B14F-4D97-AF65-F5344CB8AC3E}">
         <p14:creationId xmlns:p14="http://schemas.microsoft.com/office/powerpoint/2010/main" val="972375569"/>
+      </p:ext>
+    </p:extLst>
+  </p:cSld>
+  <p:clrMapOvr>
+    <a:masterClrMapping/>
+  </p:clrMapOvr>
+</p:notes>
+</file>
+
+<file path=ppt/notesSlides/notesSlide5.xml><?xml version="1.0" encoding="utf-8"?>
+<p:notes xmlns:a="http://schemas.openxmlformats.org/drawingml/2006/main" xmlns:r="http://schemas.openxmlformats.org/officeDocument/2006/relationships" xmlns:p="http://schemas.openxmlformats.org/presentationml/2006/main">
+  <p:cSld>
+    <p:spTree>
+      <p:nvGrpSpPr>
+        <p:cNvPr id="1" name=""/>
+        <p:cNvGrpSpPr/>
+        <p:nvPr/>
+      </p:nvGrpSpPr>
+      <p:grpSpPr>
+        <a:xfrm>
+          <a:off x="0" y="0"/>
+          <a:ext cx="0" cy="0"/>
+          <a:chOff x="0" y="0"/>
+          <a:chExt cx="0" cy="0"/>
+        </a:xfrm>
+      </p:grpSpPr>
+      <p:sp>
+        <p:nvSpPr>
+          <p:cNvPr id="2" name="Slide Image Placeholder 1"/>
+          <p:cNvSpPr>
+            <a:spLocks noGrp="1" noRot="1" noChangeAspect="1"/>
+          </p:cNvSpPr>
+          <p:nvPr>
+            <p:ph type="sldImg"/>
+          </p:nvPr>
+        </p:nvSpPr>
+        <p:spPr/>
+      </p:sp>
+      <p:sp>
+        <p:nvSpPr>
+          <p:cNvPr id="3" name="Notes Placeholder 2"/>
+          <p:cNvSpPr>
+            <a:spLocks noGrp="1"/>
+          </p:cNvSpPr>
+          <p:nvPr>
+            <p:ph type="body" idx="1"/>
+          </p:nvPr>
+        </p:nvSpPr>
+        <p:spPr/>
+        <p:txBody>
+          <a:bodyPr/>
+          <a:lstStyle/>
+          <a:p>
+            <a:r>
+              <a:rPr lang="fr-FR" dirty="0" err="1"/>
+              <a:t>wget</a:t>
+            </a:r>
+            <a:r>
+              <a:rPr lang="fr-FR" dirty="0"/>
+              <a:t> -q https://raw.githubusercontent.com/frankwxu/digital-forensics-lab/main/NIST_Data_Leakage_Case/py_version/pycode/list_partitions.py</a:t>
+            </a:r>
+          </a:p>
+          <a:p>
+            <a:endParaRPr lang="fr-FR" dirty="0"/>
+          </a:p>
+          <a:p>
+            <a:endParaRPr lang="en-US" dirty="0"/>
+          </a:p>
+        </p:txBody>
+      </p:sp>
+      <p:sp>
+        <p:nvSpPr>
+          <p:cNvPr id="4" name="Slide Number Placeholder 3"/>
+          <p:cNvSpPr>
+            <a:spLocks noGrp="1"/>
+          </p:cNvSpPr>
+          <p:nvPr>
+            <p:ph type="sldNum" sz="quarter" idx="5"/>
+          </p:nvPr>
+        </p:nvSpPr>
+        <p:spPr/>
+        <p:txBody>
+          <a:bodyPr/>
+          <a:lstStyle/>
+          <a:p>
+            <a:fld id="{DDBF98C7-164A-4723-84F0-B1E4B080DDEC}" type="slidenum">
+              <a:rPr lang="en-US" smtClean="0"/>
+              <a:t>7</a:t>
+            </a:fld>
+            <a:endParaRPr lang="en-US"/>
+          </a:p>
+        </p:txBody>
+      </p:sp>
+    </p:spTree>
+    <p:extLst>
+      <p:ext uri="{BB962C8B-B14F-4D97-AF65-F5344CB8AC3E}">
+        <p14:creationId xmlns:p14="http://schemas.microsoft.com/office/powerpoint/2010/main" val="2691154708"/>
       </p:ext>
     </p:extLst>
   </p:cSld>
@@ -5338,7 +5634,7 @@
           <p:nvPr/>
         </p:nvPicPr>
         <p:blipFill>
-          <a:blip r:embed="rId2"/>
+          <a:blip r:embed="rId3"/>
           <a:stretch>
             <a:fillRect/>
           </a:stretch>
@@ -5368,7 +5664,7 @@
           <p:nvPr/>
         </p:nvPicPr>
         <p:blipFill>
-          <a:blip r:embed="rId3"/>
+          <a:blip r:embed="rId4"/>
           <a:stretch>
             <a:fillRect/>
           </a:stretch>
@@ -5655,6 +5951,314 @@
     <p:extLst>
       <p:ext uri="{BB962C8B-B14F-4D97-AF65-F5344CB8AC3E}">
         <p14:creationId xmlns:p14="http://schemas.microsoft.com/office/powerpoint/2010/main" val="1652510254"/>
+      </p:ext>
+    </p:extLst>
+  </p:cSld>
+  <p:clrMapOvr>
+    <a:masterClrMapping/>
+  </p:clrMapOvr>
+</p:sld>
+</file>
+
+<file path=ppt/slides/slide6.xml><?xml version="1.0" encoding="utf-8"?>
+<p:sld xmlns:a="http://schemas.openxmlformats.org/drawingml/2006/main" xmlns:r="http://schemas.openxmlformats.org/officeDocument/2006/relationships" xmlns:p="http://schemas.openxmlformats.org/presentationml/2006/main">
+  <p:cSld>
+    <p:spTree>
+      <p:nvGrpSpPr>
+        <p:cNvPr id="1" name=""/>
+        <p:cNvGrpSpPr/>
+        <p:nvPr/>
+      </p:nvGrpSpPr>
+      <p:grpSpPr>
+        <a:xfrm>
+          <a:off x="0" y="0"/>
+          <a:ext cx="0" cy="0"/>
+          <a:chOff x="0" y="0"/>
+          <a:chExt cx="0" cy="0"/>
+        </a:xfrm>
+      </p:grpSpPr>
+      <p:sp>
+        <p:nvSpPr>
+          <p:cNvPr id="2" name="Title 1">
+            <a:extLst>
+              <a:ext uri="{FF2B5EF4-FFF2-40B4-BE49-F238E27FC236}">
+                <a16:creationId xmlns:a16="http://schemas.microsoft.com/office/drawing/2014/main" id="{4E2D3884-FE83-0EE6-1B39-B9739118FA3B}"/>
+              </a:ext>
+            </a:extLst>
+          </p:cNvPr>
+          <p:cNvSpPr>
+            <a:spLocks noGrp="1"/>
+          </p:cNvSpPr>
+          <p:nvPr>
+            <p:ph type="title"/>
+          </p:nvPr>
+        </p:nvSpPr>
+        <p:spPr/>
+        <p:txBody>
+          <a:bodyPr/>
+          <a:lstStyle/>
+          <a:p>
+            <a:r>
+              <a:rPr lang="en-US" dirty="0"/>
+              <a:t>Get a dd image</a:t>
+            </a:r>
+          </a:p>
+        </p:txBody>
+      </p:sp>
+      <p:pic>
+        <p:nvPicPr>
+          <p:cNvPr id="3" name="Picture 2">
+            <a:extLst>
+              <a:ext uri="{FF2B5EF4-FFF2-40B4-BE49-F238E27FC236}">
+                <a16:creationId xmlns:a16="http://schemas.microsoft.com/office/drawing/2014/main" id="{E1AAC393-231C-D24A-3FC7-288E21F62881}"/>
+              </a:ext>
+            </a:extLst>
+          </p:cNvPr>
+          <p:cNvPicPr>
+            <a:picLocks noChangeAspect="1"/>
+          </p:cNvPicPr>
+          <p:nvPr/>
+        </p:nvPicPr>
+        <p:blipFill>
+          <a:blip r:embed="rId2"/>
+          <a:stretch>
+            <a:fillRect/>
+          </a:stretch>
+        </p:blipFill>
+        <p:spPr>
+          <a:xfrm>
+            <a:off x="926123" y="2061631"/>
+            <a:ext cx="4569591" cy="523307"/>
+          </a:xfrm>
+          <a:prstGeom prst="rect">
+            <a:avLst/>
+          </a:prstGeom>
+        </p:spPr>
+      </p:pic>
+      <p:sp>
+        <p:nvSpPr>
+          <p:cNvPr id="5" name="TextBox 4">
+            <a:extLst>
+              <a:ext uri="{FF2B5EF4-FFF2-40B4-BE49-F238E27FC236}">
+                <a16:creationId xmlns:a16="http://schemas.microsoft.com/office/drawing/2014/main" id="{3F81D14B-4F94-7F51-3A15-DCCC4B5E601A}"/>
+              </a:ext>
+            </a:extLst>
+          </p:cNvPr>
+          <p:cNvSpPr txBox="1"/>
+          <p:nvPr/>
+        </p:nvSpPr>
+        <p:spPr>
+          <a:xfrm>
+            <a:off x="926123" y="3693853"/>
+            <a:ext cx="9017977" cy="923330"/>
+          </a:xfrm>
+          <a:prstGeom prst="rect">
+            <a:avLst/>
+          </a:prstGeom>
+          <a:noFill/>
+        </p:spPr>
+        <p:txBody>
+          <a:bodyPr wrap="square">
+            <a:spAutoFit/>
+          </a:bodyPr>
+          <a:lstStyle/>
+          <a:p>
+            <a:r>
+              <a:rPr lang="en-US" dirty="0">
+                <a:solidFill>
+                  <a:schemeClr val="accent4"/>
+                </a:solidFill>
+              </a:rPr>
+              <a:t>Follow the PPT to get a dd image to the folder</a:t>
+            </a:r>
+          </a:p>
+          <a:p>
+            <a:r>
+              <a:rPr lang="en-US" dirty="0"/>
+              <a:t>https://github.com/frankwxu/digital-forensics-lab/blob/main/NIST_Data_Leakage_Case/NIST_Data_Leakage_00_Env_Setting.pptx</a:t>
+            </a:r>
+          </a:p>
+        </p:txBody>
+      </p:sp>
+      <p:pic>
+        <p:nvPicPr>
+          <p:cNvPr id="8" name="Picture 7">
+            <a:extLst>
+              <a:ext uri="{FF2B5EF4-FFF2-40B4-BE49-F238E27FC236}">
+                <a16:creationId xmlns:a16="http://schemas.microsoft.com/office/drawing/2014/main" id="{D69E58F2-0F0D-64CB-273D-289C1C8DBC32}"/>
+              </a:ext>
+            </a:extLst>
+          </p:cNvPr>
+          <p:cNvPicPr>
+            <a:picLocks noChangeAspect="1"/>
+          </p:cNvPicPr>
+          <p:nvPr/>
+        </p:nvPicPr>
+        <p:blipFill>
+          <a:blip r:embed="rId3"/>
+          <a:stretch>
+            <a:fillRect/>
+          </a:stretch>
+        </p:blipFill>
+        <p:spPr>
+          <a:xfrm>
+            <a:off x="982144" y="5037257"/>
+            <a:ext cx="8298899" cy="883997"/>
+          </a:xfrm>
+          <a:prstGeom prst="rect">
+            <a:avLst/>
+          </a:prstGeom>
+        </p:spPr>
+      </p:pic>
+    </p:spTree>
+    <p:extLst>
+      <p:ext uri="{BB962C8B-B14F-4D97-AF65-F5344CB8AC3E}">
+        <p14:creationId xmlns:p14="http://schemas.microsoft.com/office/powerpoint/2010/main" val="708627298"/>
+      </p:ext>
+    </p:extLst>
+  </p:cSld>
+  <p:clrMapOvr>
+    <a:masterClrMapping/>
+  </p:clrMapOvr>
+</p:sld>
+</file>
+
+<file path=ppt/slides/slide7.xml><?xml version="1.0" encoding="utf-8"?>
+<p:sld xmlns:a="http://schemas.openxmlformats.org/drawingml/2006/main" xmlns:r="http://schemas.openxmlformats.org/officeDocument/2006/relationships" xmlns:p="http://schemas.openxmlformats.org/presentationml/2006/main">
+  <p:cSld>
+    <p:spTree>
+      <p:nvGrpSpPr>
+        <p:cNvPr id="1" name=""/>
+        <p:cNvGrpSpPr/>
+        <p:nvPr/>
+      </p:nvGrpSpPr>
+      <p:grpSpPr>
+        <a:xfrm>
+          <a:off x="0" y="0"/>
+          <a:ext cx="0" cy="0"/>
+          <a:chOff x="0" y="0"/>
+          <a:chExt cx="0" cy="0"/>
+        </a:xfrm>
+      </p:grpSpPr>
+      <p:sp>
+        <p:nvSpPr>
+          <p:cNvPr id="2" name="Title 1">
+            <a:extLst>
+              <a:ext uri="{FF2B5EF4-FFF2-40B4-BE49-F238E27FC236}">
+                <a16:creationId xmlns:a16="http://schemas.microsoft.com/office/drawing/2014/main" id="{2A9C782C-EF48-B6E8-7D43-CAB8C414A1B2}"/>
+              </a:ext>
+            </a:extLst>
+          </p:cNvPr>
+          <p:cNvSpPr>
+            <a:spLocks noGrp="1"/>
+          </p:cNvSpPr>
+          <p:nvPr>
+            <p:ph type="title"/>
+          </p:nvPr>
+        </p:nvSpPr>
+        <p:spPr/>
+        <p:txBody>
+          <a:bodyPr/>
+          <a:lstStyle/>
+          <a:p>
+            <a:endParaRPr lang="en-US"/>
+          </a:p>
+        </p:txBody>
+      </p:sp>
+      <p:pic>
+        <p:nvPicPr>
+          <p:cNvPr id="10" name="Picture 9">
+            <a:extLst>
+              <a:ext uri="{FF2B5EF4-FFF2-40B4-BE49-F238E27FC236}">
+                <a16:creationId xmlns:a16="http://schemas.microsoft.com/office/drawing/2014/main" id="{143A851C-44FD-05D0-FFA8-578EF8258E13}"/>
+              </a:ext>
+            </a:extLst>
+          </p:cNvPr>
+          <p:cNvPicPr>
+            <a:picLocks noChangeAspect="1"/>
+          </p:cNvPicPr>
+          <p:nvPr/>
+        </p:nvPicPr>
+        <p:blipFill>
+          <a:blip r:embed="rId3"/>
+          <a:stretch>
+            <a:fillRect/>
+          </a:stretch>
+        </p:blipFill>
+        <p:spPr>
+          <a:xfrm>
+            <a:off x="838200" y="2719846"/>
+            <a:ext cx="10429912" cy="1465292"/>
+          </a:xfrm>
+          <a:prstGeom prst="rect">
+            <a:avLst/>
+          </a:prstGeom>
+        </p:spPr>
+      </p:pic>
+    </p:spTree>
+    <p:extLst>
+      <p:ext uri="{BB962C8B-B14F-4D97-AF65-F5344CB8AC3E}">
+        <p14:creationId xmlns:p14="http://schemas.microsoft.com/office/powerpoint/2010/main" val="1742394460"/>
+      </p:ext>
+    </p:extLst>
+  </p:cSld>
+  <p:clrMapOvr>
+    <a:masterClrMapping/>
+  </p:clrMapOvr>
+</p:sld>
+</file>
+
+<file path=ppt/slides/slide8.xml><?xml version="1.0" encoding="utf-8"?>
+<p:sld xmlns:a="http://schemas.openxmlformats.org/drawingml/2006/main" xmlns:r="http://schemas.openxmlformats.org/officeDocument/2006/relationships" xmlns:p="http://schemas.openxmlformats.org/presentationml/2006/main">
+  <p:cSld>
+    <p:spTree>
+      <p:nvGrpSpPr>
+        <p:cNvPr id="1" name=""/>
+        <p:cNvGrpSpPr/>
+        <p:nvPr/>
+      </p:nvGrpSpPr>
+      <p:grpSpPr>
+        <a:xfrm>
+          <a:off x="0" y="0"/>
+          <a:ext cx="0" cy="0"/>
+          <a:chOff x="0" y="0"/>
+          <a:chExt cx="0" cy="0"/>
+        </a:xfrm>
+      </p:grpSpPr>
+      <p:pic>
+        <p:nvPicPr>
+          <p:cNvPr id="4" name="Picture 3">
+            <a:extLst>
+              <a:ext uri="{FF2B5EF4-FFF2-40B4-BE49-F238E27FC236}">
+                <a16:creationId xmlns:a16="http://schemas.microsoft.com/office/drawing/2014/main" id="{1F5FB37B-34D3-FA44-8591-4CF2EEE583F1}"/>
+              </a:ext>
+            </a:extLst>
+          </p:cNvPr>
+          <p:cNvPicPr>
+            <a:picLocks noChangeAspect="1"/>
+          </p:cNvPicPr>
+          <p:nvPr/>
+        </p:nvPicPr>
+        <p:blipFill>
+          <a:blip r:embed="rId2"/>
+          <a:stretch>
+            <a:fillRect/>
+          </a:stretch>
+        </p:blipFill>
+        <p:spPr>
+          <a:xfrm>
+            <a:off x="1805568" y="933233"/>
+            <a:ext cx="8580864" cy="4991533"/>
+          </a:xfrm>
+          <a:prstGeom prst="rect">
+            <a:avLst/>
+          </a:prstGeom>
+        </p:spPr>
+      </p:pic>
+    </p:spTree>
+    <p:extLst>
+      <p:ext uri="{BB962C8B-B14F-4D97-AF65-F5344CB8AC3E}">
+        <p14:creationId xmlns:p14="http://schemas.microsoft.com/office/powerpoint/2010/main" val="3003831719"/>
       </p:ext>
     </p:extLst>
   </p:cSld>

</xml_diff>